<commit_message>
update slides: discuss illusion
</commit_message>
<xml_diff>
--- a/toss/toss.pptx
+++ b/toss/toss.pptx
@@ -8,6 +8,7 @@
     <p:sldId id="256" r:id="rId5"/>
     <p:sldId id="257" r:id="rId6"/>
     <p:sldId id="258" r:id="rId7"/>
+    <p:sldId id="259" r:id="rId8"/>
   </p:sldIdLst>
   <p:sldSz cx="12192000" cy="6858000"/>
   <p:notesSz cx="6858000" cy="9144000"/>
@@ -106,6 +107,11 @@
       </a:defRPr>
     </a:lvl9pPr>
   </p:defaultTextStyle>
+  <p:extLst>
+    <p:ext uri="{EFAFB233-063F-42B5-8137-9DF3F51BA10A}">
+      <p15:sldGuideLst xmlns:p15="http://schemas.microsoft.com/office/powerpoint/2012/main"/>
+    </p:ext>
+  </p:extLst>
 </p:presentation>
 </file>
 
@@ -256,7 +262,7 @@
           <a:p>
             <a:fld id="{F31AD916-741E-4438-A7CA-45FCA07D12C1}" type="datetimeFigureOut">
               <a:rPr lang="en-US" smtClean="0"/>
-              <a:t>5/18/2023</a:t>
+              <a:t>5/19/2023</a:t>
             </a:fld>
             <a:endParaRPr lang="en-US"/>
           </a:p>
@@ -454,7 +460,7 @@
           <a:p>
             <a:fld id="{F31AD916-741E-4438-A7CA-45FCA07D12C1}" type="datetimeFigureOut">
               <a:rPr lang="en-US" smtClean="0"/>
-              <a:t>5/18/2023</a:t>
+              <a:t>5/19/2023</a:t>
             </a:fld>
             <a:endParaRPr lang="en-US"/>
           </a:p>
@@ -662,7 +668,7 @@
           <a:p>
             <a:fld id="{F31AD916-741E-4438-A7CA-45FCA07D12C1}" type="datetimeFigureOut">
               <a:rPr lang="en-US" smtClean="0"/>
-              <a:t>5/18/2023</a:t>
+              <a:t>5/19/2023</a:t>
             </a:fld>
             <a:endParaRPr lang="en-US"/>
           </a:p>
@@ -860,7 +866,7 @@
           <a:p>
             <a:fld id="{F31AD916-741E-4438-A7CA-45FCA07D12C1}" type="datetimeFigureOut">
               <a:rPr lang="en-US" smtClean="0"/>
-              <a:t>5/18/2023</a:t>
+              <a:t>5/19/2023</a:t>
             </a:fld>
             <a:endParaRPr lang="en-US"/>
           </a:p>
@@ -1135,7 +1141,7 @@
           <a:p>
             <a:fld id="{F31AD916-741E-4438-A7CA-45FCA07D12C1}" type="datetimeFigureOut">
               <a:rPr lang="en-US" smtClean="0"/>
-              <a:t>5/18/2023</a:t>
+              <a:t>5/19/2023</a:t>
             </a:fld>
             <a:endParaRPr lang="en-US"/>
           </a:p>
@@ -1400,7 +1406,7 @@
           <a:p>
             <a:fld id="{F31AD916-741E-4438-A7CA-45FCA07D12C1}" type="datetimeFigureOut">
               <a:rPr lang="en-US" smtClean="0"/>
-              <a:t>5/18/2023</a:t>
+              <a:t>5/19/2023</a:t>
             </a:fld>
             <a:endParaRPr lang="en-US"/>
           </a:p>
@@ -1812,7 +1818,7 @@
           <a:p>
             <a:fld id="{F31AD916-741E-4438-A7CA-45FCA07D12C1}" type="datetimeFigureOut">
               <a:rPr lang="en-US" smtClean="0"/>
-              <a:t>5/18/2023</a:t>
+              <a:t>5/19/2023</a:t>
             </a:fld>
             <a:endParaRPr lang="en-US"/>
           </a:p>
@@ -1953,7 +1959,7 @@
           <a:p>
             <a:fld id="{F31AD916-741E-4438-A7CA-45FCA07D12C1}" type="datetimeFigureOut">
               <a:rPr lang="en-US" smtClean="0"/>
-              <a:t>5/18/2023</a:t>
+              <a:t>5/19/2023</a:t>
             </a:fld>
             <a:endParaRPr lang="en-US"/>
           </a:p>
@@ -2066,7 +2072,7 @@
           <a:p>
             <a:fld id="{F31AD916-741E-4438-A7CA-45FCA07D12C1}" type="datetimeFigureOut">
               <a:rPr lang="en-US" smtClean="0"/>
-              <a:t>5/18/2023</a:t>
+              <a:t>5/19/2023</a:t>
             </a:fld>
             <a:endParaRPr lang="en-US"/>
           </a:p>
@@ -2377,7 +2383,7 @@
           <a:p>
             <a:fld id="{F31AD916-741E-4438-A7CA-45FCA07D12C1}" type="datetimeFigureOut">
               <a:rPr lang="en-US" smtClean="0"/>
-              <a:t>5/18/2023</a:t>
+              <a:t>5/19/2023</a:t>
             </a:fld>
             <a:endParaRPr lang="en-US"/>
           </a:p>
@@ -2665,7 +2671,7 @@
           <a:p>
             <a:fld id="{F31AD916-741E-4438-A7CA-45FCA07D12C1}" type="datetimeFigureOut">
               <a:rPr lang="en-US" smtClean="0"/>
-              <a:t>5/18/2023</a:t>
+              <a:t>5/19/2023</a:t>
             </a:fld>
             <a:endParaRPr lang="en-US"/>
           </a:p>
@@ -2906,7 +2912,7 @@
           <a:p>
             <a:fld id="{F31AD916-741E-4438-A7CA-45FCA07D12C1}" type="datetimeFigureOut">
               <a:rPr lang="en-US" smtClean="0"/>
-              <a:t>5/18/2023</a:t>
+              <a:t>5/19/2023</a:t>
             </a:fld>
             <a:endParaRPr lang="en-US"/>
           </a:p>
@@ -3691,8 +3697,8 @@
           </a:graphicData>
         </a:graphic>
       </p:graphicFrame>
-      <mc:AlternateContent xmlns:mc="http://schemas.openxmlformats.org/markup-compatibility/2006">
-        <mc:Choice xmlns:a14="http://schemas.microsoft.com/office/drawing/2010/main" Requires="a14">
+      <mc:AlternateContent xmlns:mc="http://schemas.openxmlformats.org/markup-compatibility/2006" xmlns:a14="http://schemas.microsoft.com/office/drawing/2010/main">
+        <mc:Choice Requires="a14">
           <p:sp>
             <p:nvSpPr>
               <p:cNvPr id="8" name="TextBox 7">
@@ -3721,6 +3727,7 @@
               </a:bodyPr>
               <a:lstStyle/>
               <a:p>
+                <a:pPr/>
                 <a14:m>
                   <m:oMathPara xmlns:m="http://schemas.openxmlformats.org/officeDocument/2006/math">
                     <m:oMathParaPr>
@@ -4143,7 +4150,7 @@
             </p:txBody>
           </p:sp>
         </mc:Choice>
-        <mc:Fallback>
+        <mc:Fallback xmlns="">
           <p:sp>
             <p:nvSpPr>
               <p:cNvPr id="8" name="TextBox 7">
@@ -4218,8 +4225,8 @@
           <a:chExt cx="0" cy="0"/>
         </a:xfrm>
       </p:grpSpPr>
-      <mc:AlternateContent xmlns:mc="http://schemas.openxmlformats.org/markup-compatibility/2006">
-        <mc:Choice xmlns:a14="http://schemas.microsoft.com/office/drawing/2010/main" Requires="a14">
+      <mc:AlternateContent xmlns:mc="http://schemas.openxmlformats.org/markup-compatibility/2006" xmlns:a14="http://schemas.microsoft.com/office/drawing/2010/main">
+        <mc:Choice Requires="a14">
           <p:sp>
             <p:nvSpPr>
               <p:cNvPr id="10" name="TextBox 9">
@@ -4437,7 +4444,7 @@
             </p:txBody>
           </p:sp>
         </mc:Choice>
-        <mc:Fallback>
+        <mc:Fallback xmlns="">
           <p:sp>
             <p:nvSpPr>
               <p:cNvPr id="10" name="TextBox 9">
@@ -4482,8 +4489,8 @@
           </p:sp>
         </mc:Fallback>
       </mc:AlternateContent>
-      <mc:AlternateContent xmlns:mc="http://schemas.openxmlformats.org/markup-compatibility/2006">
-        <mc:Choice xmlns:a14="http://schemas.microsoft.com/office/drawing/2010/main" Requires="a14">
+      <mc:AlternateContent xmlns:mc="http://schemas.openxmlformats.org/markup-compatibility/2006" xmlns:a14="http://schemas.microsoft.com/office/drawing/2010/main">
+        <mc:Choice Requires="a14">
           <p:sp>
             <p:nvSpPr>
               <p:cNvPr id="3" name="TextBox 2">
@@ -4512,6 +4519,7 @@
               </a:bodyPr>
               <a:lstStyle/>
               <a:p>
+                <a:pPr/>
                 <a14:m>
                   <m:oMathPara xmlns:m="http://schemas.openxmlformats.org/officeDocument/2006/math">
                     <m:oMathParaPr>
@@ -4934,7 +4942,7 @@
             </p:txBody>
           </p:sp>
         </mc:Choice>
-        <mc:Fallback>
+        <mc:Fallback xmlns="">
           <p:sp>
             <p:nvSpPr>
               <p:cNvPr id="3" name="TextBox 2">
@@ -5377,8 +5385,8 @@
           </a:graphicData>
         </a:graphic>
       </p:graphicFrame>
-      <mc:AlternateContent xmlns:mc="http://schemas.openxmlformats.org/markup-compatibility/2006">
-        <mc:Choice xmlns:a14="http://schemas.microsoft.com/office/drawing/2010/main" Requires="a14">
+      <mc:AlternateContent xmlns:mc="http://schemas.openxmlformats.org/markup-compatibility/2006" xmlns:a14="http://schemas.microsoft.com/office/drawing/2010/main">
+        <mc:Choice Requires="a14">
           <p:sp>
             <p:nvSpPr>
               <p:cNvPr id="4" name="TextBox 3">
@@ -5746,7 +5754,7 @@
             </p:txBody>
           </p:sp>
         </mc:Choice>
-        <mc:Fallback>
+        <mc:Fallback xmlns="">
           <p:sp>
             <p:nvSpPr>
               <p:cNvPr id="4" name="TextBox 3">
@@ -5791,8 +5799,8 @@
           </p:sp>
         </mc:Fallback>
       </mc:AlternateContent>
-      <mc:AlternateContent xmlns:mc="http://schemas.openxmlformats.org/markup-compatibility/2006">
-        <mc:Choice xmlns:a14="http://schemas.microsoft.com/office/drawing/2010/main" Requires="a14">
+      <mc:AlternateContent xmlns:mc="http://schemas.openxmlformats.org/markup-compatibility/2006" xmlns:a14="http://schemas.microsoft.com/office/drawing/2010/main">
+        <mc:Choice Requires="a14">
           <p:sp>
             <p:nvSpPr>
               <p:cNvPr id="6" name="TextBox 5">
@@ -5983,7 +5991,7 @@
             </p:txBody>
           </p:sp>
         </mc:Choice>
-        <mc:Fallback>
+        <mc:Fallback xmlns="">
           <p:sp>
             <p:nvSpPr>
               <p:cNvPr id="6" name="TextBox 5">
@@ -6028,8 +6036,8 @@
           </p:sp>
         </mc:Fallback>
       </mc:AlternateContent>
-      <mc:AlternateContent xmlns:mc="http://schemas.openxmlformats.org/markup-compatibility/2006">
-        <mc:Choice xmlns:a14="http://schemas.microsoft.com/office/drawing/2010/main" Requires="a14">
+      <mc:AlternateContent xmlns:mc="http://schemas.openxmlformats.org/markup-compatibility/2006" xmlns:a14="http://schemas.microsoft.com/office/drawing/2010/main">
+        <mc:Choice Requires="a14">
           <p:sp>
             <p:nvSpPr>
               <p:cNvPr id="9" name="TextBox 8">
@@ -6141,7 +6149,7 @@
             </p:txBody>
           </p:sp>
         </mc:Choice>
-        <mc:Fallback>
+        <mc:Fallback xmlns="">
           <p:sp>
             <p:nvSpPr>
               <p:cNvPr id="9" name="TextBox 8">
@@ -6186,8 +6194,8 @@
           </p:sp>
         </mc:Fallback>
       </mc:AlternateContent>
-      <mc:AlternateContent xmlns:mc="http://schemas.openxmlformats.org/markup-compatibility/2006">
-        <mc:Choice xmlns:a14="http://schemas.microsoft.com/office/drawing/2010/main" Requires="a14">
+      <mc:AlternateContent xmlns:mc="http://schemas.openxmlformats.org/markup-compatibility/2006" xmlns:a14="http://schemas.microsoft.com/office/drawing/2010/main">
+        <mc:Choice Requires="a14">
           <p:sp>
             <p:nvSpPr>
               <p:cNvPr id="11" name="TextBox 10">
@@ -6216,6 +6224,7 @@
               </a:bodyPr>
               <a:lstStyle/>
               <a:p>
+                <a:pPr/>
                 <a14:m>
                   <m:oMathPara xmlns:m="http://schemas.openxmlformats.org/officeDocument/2006/math">
                     <m:oMathParaPr>
@@ -6279,7 +6288,7 @@
             </p:txBody>
           </p:sp>
         </mc:Choice>
-        <mc:Fallback>
+        <mc:Fallback xmlns="">
           <p:sp>
             <p:nvSpPr>
               <p:cNvPr id="11" name="TextBox 10">
@@ -6324,8 +6333,8 @@
           </p:sp>
         </mc:Fallback>
       </mc:AlternateContent>
-      <mc:AlternateContent xmlns:mc="http://schemas.openxmlformats.org/markup-compatibility/2006">
-        <mc:Choice xmlns:a14="http://schemas.microsoft.com/office/drawing/2010/main" Requires="a14">
+      <mc:AlternateContent xmlns:mc="http://schemas.openxmlformats.org/markup-compatibility/2006" xmlns:a14="http://schemas.microsoft.com/office/drawing/2010/main">
+        <mc:Choice Requires="a14">
           <p:sp>
             <p:nvSpPr>
               <p:cNvPr id="12" name="TextBox 11">
@@ -6354,6 +6363,7 @@
               </a:bodyPr>
               <a:lstStyle/>
               <a:p>
+                <a:pPr/>
                 <a14:m>
                   <m:oMathPara xmlns:m="http://schemas.openxmlformats.org/officeDocument/2006/math">
                     <m:oMathParaPr>
@@ -6472,7 +6482,7 @@
             </p:txBody>
           </p:sp>
         </mc:Choice>
-        <mc:Fallback>
+        <mc:Fallback xmlns="">
           <p:sp>
             <p:nvSpPr>
               <p:cNvPr id="12" name="TextBox 11">
@@ -6517,8 +6527,8 @@
           </p:sp>
         </mc:Fallback>
       </mc:AlternateContent>
-      <mc:AlternateContent xmlns:mc="http://schemas.openxmlformats.org/markup-compatibility/2006">
-        <mc:Choice xmlns:a14="http://schemas.microsoft.com/office/drawing/2010/main" Requires="a14">
+      <mc:AlternateContent xmlns:mc="http://schemas.openxmlformats.org/markup-compatibility/2006" xmlns:a14="http://schemas.microsoft.com/office/drawing/2010/main">
+        <mc:Choice Requires="a14">
           <p:sp>
             <p:nvSpPr>
               <p:cNvPr id="13" name="TextBox 12">
@@ -6547,6 +6557,7 @@
               </a:bodyPr>
               <a:lstStyle/>
               <a:p>
+                <a:pPr/>
                 <a14:m>
                   <m:oMathPara xmlns:m="http://schemas.openxmlformats.org/officeDocument/2006/math">
                     <m:oMathParaPr>
@@ -6598,7 +6609,7 @@
             </p:txBody>
           </p:sp>
         </mc:Choice>
-        <mc:Fallback>
+        <mc:Fallback xmlns="">
           <p:sp>
             <p:nvSpPr>
               <p:cNvPr id="13" name="TextBox 12">
@@ -6643,8 +6654,8 @@
           </p:sp>
         </mc:Fallback>
       </mc:AlternateContent>
-      <mc:AlternateContent xmlns:mc="http://schemas.openxmlformats.org/markup-compatibility/2006">
-        <mc:Choice xmlns:a14="http://schemas.microsoft.com/office/drawing/2010/main" Requires="a14">
+      <mc:AlternateContent xmlns:mc="http://schemas.openxmlformats.org/markup-compatibility/2006" xmlns:a14="http://schemas.microsoft.com/office/drawing/2010/main">
+        <mc:Choice Requires="a14">
           <p:sp>
             <p:nvSpPr>
               <p:cNvPr id="15" name="TextBox 14">
@@ -6761,7 +6772,7 @@
             </p:txBody>
           </p:sp>
         </mc:Choice>
-        <mc:Fallback>
+        <mc:Fallback xmlns="">
           <p:sp>
             <p:nvSpPr>
               <p:cNvPr id="15" name="TextBox 14">
@@ -6810,6 +6821,1336 @@
     <p:extLst>
       <p:ext uri="{BB962C8B-B14F-4D97-AF65-F5344CB8AC3E}">
         <p14:creationId xmlns:p14="http://schemas.microsoft.com/office/powerpoint/2010/main" val="2986726507"/>
+      </p:ext>
+    </p:extLst>
+  </p:cSld>
+  <p:clrMapOvr>
+    <a:masterClrMapping/>
+  </p:clrMapOvr>
+</p:sld>
+</file>
+
+<file path=ppt/slides/slide4.xml><?xml version="1.0" encoding="utf-8"?>
+<p:sld xmlns:a="http://schemas.openxmlformats.org/drawingml/2006/main" xmlns:r="http://schemas.openxmlformats.org/officeDocument/2006/relationships" xmlns:p="http://schemas.openxmlformats.org/presentationml/2006/main">
+  <p:cSld>
+    <p:spTree>
+      <p:nvGrpSpPr>
+        <p:cNvPr id="1" name=""/>
+        <p:cNvGrpSpPr/>
+        <p:nvPr/>
+      </p:nvGrpSpPr>
+      <p:grpSpPr>
+        <a:xfrm>
+          <a:off x="0" y="0"/>
+          <a:ext cx="0" cy="0"/>
+          <a:chOff x="0" y="0"/>
+          <a:chExt cx="0" cy="0"/>
+        </a:xfrm>
+      </p:grpSpPr>
+      <mc:AlternateContent xmlns:mc="http://schemas.openxmlformats.org/markup-compatibility/2006">
+        <mc:Choice xmlns:a14="http://schemas.microsoft.com/office/drawing/2010/main" Requires="a14">
+          <p:sp>
+            <p:nvSpPr>
+              <p:cNvPr id="5" name="TextBox 4">
+                <a:extLst>
+                  <a:ext uri="{FF2B5EF4-FFF2-40B4-BE49-F238E27FC236}">
+                    <a16:creationId xmlns:a16="http://schemas.microsoft.com/office/drawing/2014/main" id="{CB6B27CE-6159-F8CE-EAE7-662741CF548B}"/>
+                  </a:ext>
+                </a:extLst>
+              </p:cNvPr>
+              <p:cNvSpPr txBox="1"/>
+              <p:nvPr/>
+            </p:nvSpPr>
+            <p:spPr>
+              <a:xfrm>
+                <a:off x="4393131" y="1843708"/>
+                <a:ext cx="1529200" cy="532966"/>
+              </a:xfrm>
+              <a:prstGeom prst="rect">
+                <a:avLst/>
+              </a:prstGeom>
+              <a:noFill/>
+            </p:spPr>
+            <p:txBody>
+              <a:bodyPr wrap="none" rtlCol="0">
+                <a:spAutoFit/>
+              </a:bodyPr>
+              <a:lstStyle/>
+              <a:p>
+                <a:pPr/>
+                <a14:m>
+                  <m:oMathPara xmlns:m="http://schemas.openxmlformats.org/officeDocument/2006/math">
+                    <m:oMathParaPr>
+                      <m:jc m:val="centerGroup"/>
+                    </m:oMathParaPr>
+                    <m:oMath xmlns:m="http://schemas.openxmlformats.org/officeDocument/2006/math">
+                      <m:sSup>
+                        <m:sSupPr>
+                          <m:ctrlPr>
+                            <a:rPr lang="en-US" sz="2800" b="1" i="1" smtClean="0">
+                              <a:latin typeface="Cambria Math" panose="02040503050406030204" pitchFamily="18" charset="0"/>
+                            </a:rPr>
+                          </m:ctrlPr>
+                        </m:sSupPr>
+                        <m:e>
+                          <m:r>
+                            <a:rPr lang="en-US" sz="2800" b="1" i="1" smtClean="0">
+                              <a:latin typeface="Cambria Math" panose="02040503050406030204" pitchFamily="18" charset="0"/>
+                            </a:rPr>
+                            <m:t>𝒄</m:t>
+                          </m:r>
+                        </m:e>
+                        <m:sup>
+                          <m:r>
+                            <a:rPr lang="en-US" sz="2800" b="1" i="1" smtClean="0">
+                              <a:latin typeface="Cambria Math" panose="02040503050406030204" pitchFamily="18" charset="0"/>
+                            </a:rPr>
+                            <m:t>𝟐</m:t>
+                          </m:r>
+                        </m:sup>
+                      </m:sSup>
+                      <m:r>
+                        <a:rPr lang="en-US" sz="2800" b="1" i="1" smtClean="0">
+                          <a:latin typeface="Cambria Math" panose="02040503050406030204" pitchFamily="18" charset="0"/>
+                        </a:rPr>
+                        <m:t>&gt;</m:t>
+                      </m:r>
+                      <m:r>
+                        <a:rPr lang="en-US" sz="2800" b="1" i="1" smtClean="0">
+                          <a:latin typeface="Cambria Math" panose="02040503050406030204" pitchFamily="18" charset="0"/>
+                        </a:rPr>
+                        <m:t>𝒂𝒃</m:t>
+                      </m:r>
+                    </m:oMath>
+                  </m:oMathPara>
+                </a14:m>
+                <a:endParaRPr lang="en-US" sz="2800" b="1" dirty="0"/>
+              </a:p>
+            </p:txBody>
+          </p:sp>
+        </mc:Choice>
+        <mc:Fallback>
+          <p:sp>
+            <p:nvSpPr>
+              <p:cNvPr id="5" name="TextBox 4">
+                <a:extLst>
+                  <a:ext uri="{FF2B5EF4-FFF2-40B4-BE49-F238E27FC236}">
+                    <a16:creationId xmlns:a16="http://schemas.microsoft.com/office/drawing/2014/main" id="{CB6B27CE-6159-F8CE-EAE7-662741CF548B}"/>
+                  </a:ext>
+                </a:extLst>
+              </p:cNvPr>
+              <p:cNvSpPr txBox="1">
+                <a:spLocks noRot="1" noChangeAspect="1" noMove="1" noResize="1" noEditPoints="1" noAdjustHandles="1" noChangeArrowheads="1" noChangeShapeType="1" noTextEdit="1"/>
+              </p:cNvSpPr>
+              <p:nvPr/>
+            </p:nvSpPr>
+            <p:spPr>
+              <a:xfrm>
+                <a:off x="4393131" y="1843708"/>
+                <a:ext cx="1529200" cy="532966"/>
+              </a:xfrm>
+              <a:prstGeom prst="rect">
+                <a:avLst/>
+              </a:prstGeom>
+              <a:blipFill>
+                <a:blip r:embed="rId2"/>
+                <a:stretch>
+                  <a:fillRect/>
+                </a:stretch>
+              </a:blipFill>
+            </p:spPr>
+            <p:txBody>
+              <a:bodyPr/>
+              <a:lstStyle/>
+              <a:p>
+                <a:r>
+                  <a:rPr lang="en-US">
+                    <a:noFill/>
+                  </a:rPr>
+                  <a:t> </a:t>
+                </a:r>
+              </a:p>
+            </p:txBody>
+          </p:sp>
+        </mc:Fallback>
+      </mc:AlternateContent>
+      <mc:AlternateContent xmlns:mc="http://schemas.openxmlformats.org/markup-compatibility/2006">
+        <mc:Choice xmlns:a14="http://schemas.microsoft.com/office/drawing/2010/main" Requires="a14">
+          <p:sp>
+            <p:nvSpPr>
+              <p:cNvPr id="7" name="TextBox 6">
+                <a:extLst>
+                  <a:ext uri="{FF2B5EF4-FFF2-40B4-BE49-F238E27FC236}">
+                    <a16:creationId xmlns:a16="http://schemas.microsoft.com/office/drawing/2014/main" id="{FF208FE6-0FF7-C595-E682-AB5DBC225183}"/>
+                  </a:ext>
+                </a:extLst>
+              </p:cNvPr>
+              <p:cNvSpPr txBox="1"/>
+              <p:nvPr/>
+            </p:nvSpPr>
+            <p:spPr>
+              <a:xfrm>
+                <a:off x="2224780" y="2595251"/>
+                <a:ext cx="2079800" cy="791179"/>
+              </a:xfrm>
+              <a:prstGeom prst="rect">
+                <a:avLst/>
+              </a:prstGeom>
+              <a:noFill/>
+            </p:spPr>
+            <p:txBody>
+              <a:bodyPr wrap="none" rtlCol="0">
+                <a:spAutoFit/>
+              </a:bodyPr>
+              <a:lstStyle/>
+              <a:p>
+                <a:pPr/>
+                <a14:m>
+                  <m:oMathPara xmlns:m="http://schemas.openxmlformats.org/officeDocument/2006/math">
+                    <m:oMathParaPr>
+                      <m:jc m:val="centerGroup"/>
+                    </m:oMathParaPr>
+                    <m:oMath xmlns:m="http://schemas.openxmlformats.org/officeDocument/2006/math">
+                      <m:f>
+                        <m:fPr>
+                          <m:ctrlPr>
+                            <a:rPr lang="en-US" sz="2400" b="0" i="1" smtClean="0">
+                              <a:latin typeface="Cambria Math" panose="02040503050406030204" pitchFamily="18" charset="0"/>
+                            </a:rPr>
+                          </m:ctrlPr>
+                        </m:fPr>
+                        <m:num>
+                          <m:r>
+                            <a:rPr lang="en-US" sz="2400" b="0" i="1" smtClean="0">
+                              <a:latin typeface="Cambria Math" panose="02040503050406030204" pitchFamily="18" charset="0"/>
+                            </a:rPr>
+                            <m:t>𝑎</m:t>
+                          </m:r>
+                          <m:r>
+                            <a:rPr lang="en-US" sz="2400" b="0" i="1" smtClean="0">
+                              <a:latin typeface="Cambria Math" panose="02040503050406030204" pitchFamily="18" charset="0"/>
+                            </a:rPr>
+                            <m:t>+</m:t>
+                          </m:r>
+                          <m:r>
+                            <a:rPr lang="en-US" sz="2400" b="0" i="1" smtClean="0">
+                              <a:latin typeface="Cambria Math" panose="02040503050406030204" pitchFamily="18" charset="0"/>
+                            </a:rPr>
+                            <m:t>𝑏</m:t>
+                          </m:r>
+                        </m:num>
+                        <m:den>
+                          <m:r>
+                            <a:rPr lang="en-US" sz="2400" b="0" i="1" smtClean="0">
+                              <a:latin typeface="Cambria Math" panose="02040503050406030204" pitchFamily="18" charset="0"/>
+                            </a:rPr>
+                            <m:t>4</m:t>
+                          </m:r>
+                        </m:den>
+                      </m:f>
+                      <m:r>
+                        <a:rPr lang="en-US" sz="2400" b="0" i="1" smtClean="0">
+                          <a:latin typeface="Cambria Math" panose="02040503050406030204" pitchFamily="18" charset="0"/>
+                        </a:rPr>
+                        <m:t>−</m:t>
+                      </m:r>
+                      <m:f>
+                        <m:fPr>
+                          <m:ctrlPr>
+                            <a:rPr lang="en-US" sz="2400" b="0" i="1" smtClean="0">
+                              <a:latin typeface="Cambria Math" panose="02040503050406030204" pitchFamily="18" charset="0"/>
+                            </a:rPr>
+                          </m:ctrlPr>
+                        </m:fPr>
+                        <m:num>
+                          <m:r>
+                            <a:rPr lang="en-US" sz="2400" b="0" i="1" smtClean="0">
+                              <a:latin typeface="Cambria Math" panose="02040503050406030204" pitchFamily="18" charset="0"/>
+                            </a:rPr>
+                            <m:t>𝑐</m:t>
+                          </m:r>
+                        </m:num>
+                        <m:den>
+                          <m:r>
+                            <a:rPr lang="en-US" sz="2400" b="0" i="1" smtClean="0">
+                              <a:latin typeface="Cambria Math" panose="02040503050406030204" pitchFamily="18" charset="0"/>
+                            </a:rPr>
+                            <m:t>2</m:t>
+                          </m:r>
+                        </m:den>
+                      </m:f>
+                      <m:r>
+                        <a:rPr lang="en-US" sz="2400" b="0" i="1" smtClean="0">
+                          <a:latin typeface="Cambria Math" panose="02040503050406030204" pitchFamily="18" charset="0"/>
+                        </a:rPr>
+                        <m:t>≥0</m:t>
+                      </m:r>
+                    </m:oMath>
+                  </m:oMathPara>
+                </a14:m>
+                <a:endParaRPr lang="en-US" sz="2400" dirty="0"/>
+              </a:p>
+            </p:txBody>
+          </p:sp>
+        </mc:Choice>
+        <mc:Fallback>
+          <p:sp>
+            <p:nvSpPr>
+              <p:cNvPr id="7" name="TextBox 6">
+                <a:extLst>
+                  <a:ext uri="{FF2B5EF4-FFF2-40B4-BE49-F238E27FC236}">
+                    <a16:creationId xmlns:a16="http://schemas.microsoft.com/office/drawing/2014/main" id="{FF208FE6-0FF7-C595-E682-AB5DBC225183}"/>
+                  </a:ext>
+                </a:extLst>
+              </p:cNvPr>
+              <p:cNvSpPr txBox="1">
+                <a:spLocks noRot="1" noChangeAspect="1" noMove="1" noResize="1" noEditPoints="1" noAdjustHandles="1" noChangeArrowheads="1" noChangeShapeType="1" noTextEdit="1"/>
+              </p:cNvSpPr>
+              <p:nvPr/>
+            </p:nvSpPr>
+            <p:spPr>
+              <a:xfrm>
+                <a:off x="2224780" y="2595251"/>
+                <a:ext cx="2079800" cy="791179"/>
+              </a:xfrm>
+              <a:prstGeom prst="rect">
+                <a:avLst/>
+              </a:prstGeom>
+              <a:blipFill>
+                <a:blip r:embed="rId3"/>
+                <a:stretch>
+                  <a:fillRect/>
+                </a:stretch>
+              </a:blipFill>
+            </p:spPr>
+            <p:txBody>
+              <a:bodyPr/>
+              <a:lstStyle/>
+              <a:p>
+                <a:r>
+                  <a:rPr lang="en-US">
+                    <a:noFill/>
+                  </a:rPr>
+                  <a:t> </a:t>
+                </a:r>
+              </a:p>
+            </p:txBody>
+          </p:sp>
+        </mc:Fallback>
+      </mc:AlternateContent>
+      <mc:AlternateContent xmlns:mc="http://schemas.openxmlformats.org/markup-compatibility/2006">
+        <mc:Choice xmlns:a14="http://schemas.microsoft.com/office/drawing/2010/main" Requires="a14">
+          <p:sp>
+            <p:nvSpPr>
+              <p:cNvPr id="8" name="TextBox 7">
+                <a:extLst>
+                  <a:ext uri="{FF2B5EF4-FFF2-40B4-BE49-F238E27FC236}">
+                    <a16:creationId xmlns:a16="http://schemas.microsoft.com/office/drawing/2014/main" id="{CF65227F-F111-51D2-E608-73481C332137}"/>
+                  </a:ext>
+                </a:extLst>
+              </p:cNvPr>
+              <p:cNvSpPr txBox="1"/>
+              <p:nvPr/>
+            </p:nvSpPr>
+            <p:spPr>
+              <a:xfrm>
+                <a:off x="2224780" y="3429756"/>
+                <a:ext cx="1694631" cy="461665"/>
+              </a:xfrm>
+              <a:prstGeom prst="rect">
+                <a:avLst/>
+              </a:prstGeom>
+              <a:noFill/>
+            </p:spPr>
+            <p:txBody>
+              <a:bodyPr wrap="none" rtlCol="0">
+                <a:spAutoFit/>
+              </a:bodyPr>
+              <a:lstStyle/>
+              <a:p>
+                <a:pPr/>
+                <a14:m>
+                  <m:oMathPara xmlns:m="http://schemas.openxmlformats.org/officeDocument/2006/math">
+                    <m:oMathParaPr>
+                      <m:jc m:val="centerGroup"/>
+                    </m:oMathParaPr>
+                    <m:oMath xmlns:m="http://schemas.openxmlformats.org/officeDocument/2006/math">
+                      <m:r>
+                        <a:rPr lang="en-US" sz="2400" b="0" i="1" smtClean="0">
+                          <a:latin typeface="Cambria Math" panose="02040503050406030204" pitchFamily="18" charset="0"/>
+                        </a:rPr>
+                        <m:t>𝑎</m:t>
+                      </m:r>
+                      <m:r>
+                        <a:rPr lang="en-US" sz="2400" b="0" i="1" smtClean="0">
+                          <a:latin typeface="Cambria Math" panose="02040503050406030204" pitchFamily="18" charset="0"/>
+                        </a:rPr>
+                        <m:t>+</m:t>
+                      </m:r>
+                      <m:r>
+                        <a:rPr lang="en-US" sz="2400" b="0" i="1" smtClean="0">
+                          <a:latin typeface="Cambria Math" panose="02040503050406030204" pitchFamily="18" charset="0"/>
+                        </a:rPr>
+                        <m:t>𝑏</m:t>
+                      </m:r>
+                      <m:r>
+                        <a:rPr lang="en-US" sz="2400" b="0" i="1" smtClean="0">
+                          <a:latin typeface="Cambria Math" panose="02040503050406030204" pitchFamily="18" charset="0"/>
+                        </a:rPr>
+                        <m:t>≥2</m:t>
+                      </m:r>
+                      <m:r>
+                        <a:rPr lang="en-US" sz="2400" b="0" i="1" smtClean="0">
+                          <a:latin typeface="Cambria Math" panose="02040503050406030204" pitchFamily="18" charset="0"/>
+                        </a:rPr>
+                        <m:t>𝑐</m:t>
+                      </m:r>
+                    </m:oMath>
+                  </m:oMathPara>
+                </a14:m>
+                <a:endParaRPr lang="en-US" sz="2400" dirty="0"/>
+              </a:p>
+            </p:txBody>
+          </p:sp>
+        </mc:Choice>
+        <mc:Fallback>
+          <p:sp>
+            <p:nvSpPr>
+              <p:cNvPr id="8" name="TextBox 7">
+                <a:extLst>
+                  <a:ext uri="{FF2B5EF4-FFF2-40B4-BE49-F238E27FC236}">
+                    <a16:creationId xmlns:a16="http://schemas.microsoft.com/office/drawing/2014/main" id="{CF65227F-F111-51D2-E608-73481C332137}"/>
+                  </a:ext>
+                </a:extLst>
+              </p:cNvPr>
+              <p:cNvSpPr txBox="1">
+                <a:spLocks noRot="1" noChangeAspect="1" noMove="1" noResize="1" noEditPoints="1" noAdjustHandles="1" noChangeArrowheads="1" noChangeShapeType="1" noTextEdit="1"/>
+              </p:cNvSpPr>
+              <p:nvPr/>
+            </p:nvSpPr>
+            <p:spPr>
+              <a:xfrm>
+                <a:off x="2224780" y="3429756"/>
+                <a:ext cx="1694631" cy="461665"/>
+              </a:xfrm>
+              <a:prstGeom prst="rect">
+                <a:avLst/>
+              </a:prstGeom>
+              <a:blipFill>
+                <a:blip r:embed="rId4"/>
+                <a:stretch>
+                  <a:fillRect/>
+                </a:stretch>
+              </a:blipFill>
+            </p:spPr>
+            <p:txBody>
+              <a:bodyPr/>
+              <a:lstStyle/>
+              <a:p>
+                <a:r>
+                  <a:rPr lang="en-US">
+                    <a:noFill/>
+                  </a:rPr>
+                  <a:t> </a:t>
+                </a:r>
+              </a:p>
+            </p:txBody>
+          </p:sp>
+        </mc:Fallback>
+      </mc:AlternateContent>
+      <mc:AlternateContent xmlns:mc="http://schemas.openxmlformats.org/markup-compatibility/2006">
+        <mc:Choice xmlns:a14="http://schemas.microsoft.com/office/drawing/2010/main" Requires="a14">
+          <p:sp>
+            <p:nvSpPr>
+              <p:cNvPr id="14" name="TextBox 13">
+                <a:extLst>
+                  <a:ext uri="{FF2B5EF4-FFF2-40B4-BE49-F238E27FC236}">
+                    <a16:creationId xmlns:a16="http://schemas.microsoft.com/office/drawing/2014/main" id="{47C19EC2-358E-49C4-E8C5-9E5CC0D0FD39}"/>
+                  </a:ext>
+                </a:extLst>
+              </p:cNvPr>
+              <p:cNvSpPr txBox="1"/>
+              <p:nvPr/>
+            </p:nvSpPr>
+            <p:spPr>
+              <a:xfrm>
+                <a:off x="6596363" y="4158160"/>
+                <a:ext cx="1965923" cy="461665"/>
+              </a:xfrm>
+              <a:prstGeom prst="rect">
+                <a:avLst/>
+              </a:prstGeom>
+              <a:noFill/>
+            </p:spPr>
+            <p:txBody>
+              <a:bodyPr wrap="none" rtlCol="0">
+                <a:spAutoFit/>
+              </a:bodyPr>
+              <a:lstStyle/>
+              <a:p>
+                <a:pPr/>
+                <a14:m>
+                  <m:oMathPara xmlns:m="http://schemas.openxmlformats.org/officeDocument/2006/math">
+                    <m:oMathParaPr>
+                      <m:jc m:val="centerGroup"/>
+                    </m:oMathParaPr>
+                    <m:oMath xmlns:m="http://schemas.openxmlformats.org/officeDocument/2006/math">
+                      <m:sSup>
+                        <m:sSupPr>
+                          <m:ctrlPr>
+                            <a:rPr lang="en-US" sz="2400" b="0" i="1" smtClean="0">
+                              <a:latin typeface="Cambria Math" panose="02040503050406030204" pitchFamily="18" charset="0"/>
+                            </a:rPr>
+                          </m:ctrlPr>
+                        </m:sSupPr>
+                        <m:e>
+                          <m:d>
+                            <m:dPr>
+                              <m:ctrlPr>
+                                <a:rPr lang="en-US" sz="2400" b="0" i="1" smtClean="0">
+                                  <a:latin typeface="Cambria Math" panose="02040503050406030204" pitchFamily="18" charset="0"/>
+                                </a:rPr>
+                              </m:ctrlPr>
+                            </m:dPr>
+                            <m:e>
+                              <m:r>
+                                <a:rPr lang="en-US" sz="2400" b="0" i="1" smtClean="0">
+                                  <a:latin typeface="Cambria Math" panose="02040503050406030204" pitchFamily="18" charset="0"/>
+                                </a:rPr>
+                                <m:t>𝑎</m:t>
+                              </m:r>
+                              <m:r>
+                                <a:rPr lang="en-US" sz="2400" b="0" i="1" smtClean="0">
+                                  <a:latin typeface="Cambria Math" panose="02040503050406030204" pitchFamily="18" charset="0"/>
+                                </a:rPr>
+                                <m:t>−</m:t>
+                              </m:r>
+                              <m:r>
+                                <a:rPr lang="en-US" sz="2400" b="0" i="1" smtClean="0">
+                                  <a:latin typeface="Cambria Math" panose="02040503050406030204" pitchFamily="18" charset="0"/>
+                                </a:rPr>
+                                <m:t>𝑏</m:t>
+                              </m:r>
+                            </m:e>
+                          </m:d>
+                        </m:e>
+                        <m:sup>
+                          <m:r>
+                            <a:rPr lang="en-US" sz="2400" b="0" i="1" smtClean="0">
+                              <a:latin typeface="Cambria Math" panose="02040503050406030204" pitchFamily="18" charset="0"/>
+                            </a:rPr>
+                            <m:t>2</m:t>
+                          </m:r>
+                        </m:sup>
+                      </m:sSup>
+                      <m:r>
+                        <a:rPr lang="en-US" sz="2400" b="0" i="1" smtClean="0">
+                          <a:latin typeface="Cambria Math" panose="02040503050406030204" pitchFamily="18" charset="0"/>
+                        </a:rPr>
+                        <m:t>&gt;0</m:t>
+                      </m:r>
+                    </m:oMath>
+                  </m:oMathPara>
+                </a14:m>
+                <a:endParaRPr lang="en-US" sz="2400" dirty="0"/>
+              </a:p>
+            </p:txBody>
+          </p:sp>
+        </mc:Choice>
+        <mc:Fallback>
+          <p:sp>
+            <p:nvSpPr>
+              <p:cNvPr id="14" name="TextBox 13">
+                <a:extLst>
+                  <a:ext uri="{FF2B5EF4-FFF2-40B4-BE49-F238E27FC236}">
+                    <a16:creationId xmlns:a16="http://schemas.microsoft.com/office/drawing/2014/main" id="{47C19EC2-358E-49C4-E8C5-9E5CC0D0FD39}"/>
+                  </a:ext>
+                </a:extLst>
+              </p:cNvPr>
+              <p:cNvSpPr txBox="1">
+                <a:spLocks noRot="1" noChangeAspect="1" noMove="1" noResize="1" noEditPoints="1" noAdjustHandles="1" noChangeArrowheads="1" noChangeShapeType="1" noTextEdit="1"/>
+              </p:cNvSpPr>
+              <p:nvPr/>
+            </p:nvSpPr>
+            <p:spPr>
+              <a:xfrm>
+                <a:off x="6596363" y="4158160"/>
+                <a:ext cx="1965923" cy="461665"/>
+              </a:xfrm>
+              <a:prstGeom prst="rect">
+                <a:avLst/>
+              </a:prstGeom>
+              <a:blipFill>
+                <a:blip r:embed="rId5"/>
+                <a:stretch>
+                  <a:fillRect/>
+                </a:stretch>
+              </a:blipFill>
+            </p:spPr>
+            <p:txBody>
+              <a:bodyPr/>
+              <a:lstStyle/>
+              <a:p>
+                <a:r>
+                  <a:rPr lang="en-US">
+                    <a:noFill/>
+                  </a:rPr>
+                  <a:t> </a:t>
+                </a:r>
+              </a:p>
+            </p:txBody>
+          </p:sp>
+        </mc:Fallback>
+      </mc:AlternateContent>
+      <mc:AlternateContent xmlns:mc="http://schemas.openxmlformats.org/markup-compatibility/2006">
+        <mc:Choice xmlns:a14="http://schemas.microsoft.com/office/drawing/2010/main" Requires="a14">
+          <p:sp>
+            <p:nvSpPr>
+              <p:cNvPr id="16" name="TextBox 15">
+                <a:extLst>
+                  <a:ext uri="{FF2B5EF4-FFF2-40B4-BE49-F238E27FC236}">
+                    <a16:creationId xmlns:a16="http://schemas.microsoft.com/office/drawing/2014/main" id="{2BD75150-C4D8-4989-640C-B115FDEB79A6}"/>
+                  </a:ext>
+                </a:extLst>
+              </p:cNvPr>
+              <p:cNvSpPr txBox="1"/>
+              <p:nvPr/>
+            </p:nvSpPr>
+            <p:spPr>
+              <a:xfrm>
+                <a:off x="2098848" y="3891421"/>
+                <a:ext cx="2168351" cy="995144"/>
+              </a:xfrm>
+              <a:prstGeom prst="rect">
+                <a:avLst/>
+              </a:prstGeom>
+              <a:noFill/>
+            </p:spPr>
+            <p:txBody>
+              <a:bodyPr wrap="none" rtlCol="0">
+                <a:spAutoFit/>
+              </a:bodyPr>
+              <a:lstStyle/>
+              <a:p>
+                <a:pPr/>
+                <a14:m>
+                  <m:oMathPara xmlns:m="http://schemas.openxmlformats.org/officeDocument/2006/math">
+                    <m:oMathParaPr>
+                      <m:jc m:val="centerGroup"/>
+                    </m:oMathParaPr>
+                    <m:oMath xmlns:m="http://schemas.openxmlformats.org/officeDocument/2006/math">
+                      <m:sSup>
+                        <m:sSupPr>
+                          <m:ctrlPr>
+                            <a:rPr lang="en-US" sz="2400" b="0" i="1" smtClean="0">
+                              <a:latin typeface="Cambria Math" panose="02040503050406030204" pitchFamily="18" charset="0"/>
+                            </a:rPr>
+                          </m:ctrlPr>
+                        </m:sSupPr>
+                        <m:e>
+                          <m:d>
+                            <m:dPr>
+                              <m:ctrlPr>
+                                <a:rPr lang="en-US" sz="2400" b="0" i="1" smtClean="0">
+                                  <a:latin typeface="Cambria Math" panose="02040503050406030204" pitchFamily="18" charset="0"/>
+                                </a:rPr>
+                              </m:ctrlPr>
+                            </m:dPr>
+                            <m:e>
+                              <m:f>
+                                <m:fPr>
+                                  <m:ctrlPr>
+                                    <a:rPr lang="en-US" sz="2400" b="0" i="1" smtClean="0">
+                                      <a:latin typeface="Cambria Math" panose="02040503050406030204" pitchFamily="18" charset="0"/>
+                                    </a:rPr>
+                                  </m:ctrlPr>
+                                </m:fPr>
+                                <m:num>
+                                  <m:r>
+                                    <a:rPr lang="en-US" sz="2400" b="0" i="1" smtClean="0">
+                                      <a:latin typeface="Cambria Math" panose="02040503050406030204" pitchFamily="18" charset="0"/>
+                                    </a:rPr>
+                                    <m:t>𝑎</m:t>
+                                  </m:r>
+                                  <m:r>
+                                    <a:rPr lang="en-US" sz="2400" b="0" i="1" smtClean="0">
+                                      <a:latin typeface="Cambria Math" panose="02040503050406030204" pitchFamily="18" charset="0"/>
+                                    </a:rPr>
+                                    <m:t>+</m:t>
+                                  </m:r>
+                                  <m:r>
+                                    <a:rPr lang="en-US" sz="2400" b="0" i="1" smtClean="0">
+                                      <a:latin typeface="Cambria Math" panose="02040503050406030204" pitchFamily="18" charset="0"/>
+                                    </a:rPr>
+                                    <m:t>𝑏</m:t>
+                                  </m:r>
+                                </m:num>
+                                <m:den>
+                                  <m:r>
+                                    <a:rPr lang="en-US" sz="2400" b="0" i="1" smtClean="0">
+                                      <a:latin typeface="Cambria Math" panose="02040503050406030204" pitchFamily="18" charset="0"/>
+                                    </a:rPr>
+                                    <m:t>2</m:t>
+                                  </m:r>
+                                </m:den>
+                              </m:f>
+                            </m:e>
+                          </m:d>
+                        </m:e>
+                        <m:sup>
+                          <m:r>
+                            <a:rPr lang="en-US" sz="2400" b="0" i="1" smtClean="0">
+                              <a:latin typeface="Cambria Math" panose="02040503050406030204" pitchFamily="18" charset="0"/>
+                            </a:rPr>
+                            <m:t>2</m:t>
+                          </m:r>
+                        </m:sup>
+                      </m:sSup>
+                      <m:r>
+                        <a:rPr lang="en-US" sz="2400" b="0" i="1" smtClean="0">
+                          <a:latin typeface="Cambria Math" panose="02040503050406030204" pitchFamily="18" charset="0"/>
+                        </a:rPr>
+                        <m:t>≥</m:t>
+                      </m:r>
+                      <m:sSup>
+                        <m:sSupPr>
+                          <m:ctrlPr>
+                            <a:rPr lang="en-US" sz="2400" b="0" i="1" smtClean="0">
+                              <a:latin typeface="Cambria Math" panose="02040503050406030204" pitchFamily="18" charset="0"/>
+                            </a:rPr>
+                          </m:ctrlPr>
+                        </m:sSupPr>
+                        <m:e>
+                          <m:r>
+                            <a:rPr lang="en-US" sz="2400" b="0" i="1" smtClean="0">
+                              <a:latin typeface="Cambria Math" panose="02040503050406030204" pitchFamily="18" charset="0"/>
+                            </a:rPr>
+                            <m:t>𝑐</m:t>
+                          </m:r>
+                        </m:e>
+                        <m:sup>
+                          <m:r>
+                            <a:rPr lang="en-US" sz="2400" b="0" i="1" smtClean="0">
+                              <a:latin typeface="Cambria Math" panose="02040503050406030204" pitchFamily="18" charset="0"/>
+                            </a:rPr>
+                            <m:t>2</m:t>
+                          </m:r>
+                        </m:sup>
+                      </m:sSup>
+                    </m:oMath>
+                  </m:oMathPara>
+                </a14:m>
+                <a:endParaRPr lang="en-US" sz="2400" dirty="0"/>
+              </a:p>
+            </p:txBody>
+          </p:sp>
+        </mc:Choice>
+        <mc:Fallback>
+          <p:sp>
+            <p:nvSpPr>
+              <p:cNvPr id="16" name="TextBox 15">
+                <a:extLst>
+                  <a:ext uri="{FF2B5EF4-FFF2-40B4-BE49-F238E27FC236}">
+                    <a16:creationId xmlns:a16="http://schemas.microsoft.com/office/drawing/2014/main" id="{2BD75150-C4D8-4989-640C-B115FDEB79A6}"/>
+                  </a:ext>
+                </a:extLst>
+              </p:cNvPr>
+              <p:cNvSpPr txBox="1">
+                <a:spLocks noRot="1" noChangeAspect="1" noMove="1" noResize="1" noEditPoints="1" noAdjustHandles="1" noChangeArrowheads="1" noChangeShapeType="1" noTextEdit="1"/>
+              </p:cNvSpPr>
+              <p:nvPr/>
+            </p:nvSpPr>
+            <p:spPr>
+              <a:xfrm>
+                <a:off x="2098848" y="3891421"/>
+                <a:ext cx="2168351" cy="995144"/>
+              </a:xfrm>
+              <a:prstGeom prst="rect">
+                <a:avLst/>
+              </a:prstGeom>
+              <a:blipFill>
+                <a:blip r:embed="rId6"/>
+                <a:stretch>
+                  <a:fillRect/>
+                </a:stretch>
+              </a:blipFill>
+            </p:spPr>
+            <p:txBody>
+              <a:bodyPr/>
+              <a:lstStyle/>
+              <a:p>
+                <a:r>
+                  <a:rPr lang="en-US">
+                    <a:noFill/>
+                  </a:rPr>
+                  <a:t> </a:t>
+                </a:r>
+              </a:p>
+            </p:txBody>
+          </p:sp>
+        </mc:Fallback>
+      </mc:AlternateContent>
+      <mc:AlternateContent xmlns:mc="http://schemas.openxmlformats.org/markup-compatibility/2006">
+        <mc:Choice xmlns:a14="http://schemas.microsoft.com/office/drawing/2010/main" Requires="a14">
+          <p:sp>
+            <p:nvSpPr>
+              <p:cNvPr id="18" name="TextBox 17">
+                <a:extLst>
+                  <a:ext uri="{FF2B5EF4-FFF2-40B4-BE49-F238E27FC236}">
+                    <a16:creationId xmlns:a16="http://schemas.microsoft.com/office/drawing/2014/main" id="{94D772C8-59F4-853D-AF2F-85FDBB3CE43F}"/>
+                  </a:ext>
+                </a:extLst>
+              </p:cNvPr>
+              <p:cNvSpPr txBox="1"/>
+              <p:nvPr/>
+            </p:nvSpPr>
+            <p:spPr>
+              <a:xfrm>
+                <a:off x="6561482" y="2295474"/>
+                <a:ext cx="2982583" cy="995144"/>
+              </a:xfrm>
+              <a:prstGeom prst="rect">
+                <a:avLst/>
+              </a:prstGeom>
+              <a:noFill/>
+            </p:spPr>
+            <p:txBody>
+              <a:bodyPr wrap="square">
+                <a:spAutoFit/>
+              </a:bodyPr>
+              <a:lstStyle/>
+              <a:p>
+                <a:pPr/>
+                <a14:m>
+                  <m:oMathPara xmlns:m="http://schemas.openxmlformats.org/officeDocument/2006/math">
+                    <m:oMathParaPr>
+                      <m:jc m:val="centerGroup"/>
+                    </m:oMathParaPr>
+                    <m:oMath xmlns:m="http://schemas.openxmlformats.org/officeDocument/2006/math">
+                      <m:sSup>
+                        <m:sSupPr>
+                          <m:ctrlPr>
+                            <a:rPr lang="en-US" sz="2400" b="0" i="1" smtClean="0">
+                              <a:latin typeface="Cambria Math" panose="02040503050406030204" pitchFamily="18" charset="0"/>
+                            </a:rPr>
+                          </m:ctrlPr>
+                        </m:sSupPr>
+                        <m:e>
+                          <m:d>
+                            <m:dPr>
+                              <m:ctrlPr>
+                                <a:rPr lang="en-US" sz="2400" b="0" i="1" smtClean="0">
+                                  <a:latin typeface="Cambria Math" panose="02040503050406030204" pitchFamily="18" charset="0"/>
+                                </a:rPr>
+                              </m:ctrlPr>
+                            </m:dPr>
+                            <m:e>
+                              <m:f>
+                                <m:fPr>
+                                  <m:ctrlPr>
+                                    <a:rPr lang="en-US" sz="2400" b="0" i="1" smtClean="0">
+                                      <a:latin typeface="Cambria Math" panose="02040503050406030204" pitchFamily="18" charset="0"/>
+                                    </a:rPr>
+                                  </m:ctrlPr>
+                                </m:fPr>
+                                <m:num>
+                                  <m:r>
+                                    <a:rPr lang="en-US" sz="2400" b="0" i="1" smtClean="0">
+                                      <a:latin typeface="Cambria Math" panose="02040503050406030204" pitchFamily="18" charset="0"/>
+                                    </a:rPr>
+                                    <m:t>𝑎</m:t>
+                                  </m:r>
+                                  <m:r>
+                                    <a:rPr lang="en-US" sz="2400" b="0" i="1" smtClean="0">
+                                      <a:latin typeface="Cambria Math" panose="02040503050406030204" pitchFamily="18" charset="0"/>
+                                    </a:rPr>
+                                    <m:t>+</m:t>
+                                  </m:r>
+                                  <m:r>
+                                    <a:rPr lang="en-US" sz="2400" b="0" i="1" smtClean="0">
+                                      <a:latin typeface="Cambria Math" panose="02040503050406030204" pitchFamily="18" charset="0"/>
+                                    </a:rPr>
+                                    <m:t>𝑏</m:t>
+                                  </m:r>
+                                </m:num>
+                                <m:den>
+                                  <m:r>
+                                    <a:rPr lang="en-US" sz="2400" b="0" i="1" smtClean="0">
+                                      <a:latin typeface="Cambria Math" panose="02040503050406030204" pitchFamily="18" charset="0"/>
+                                    </a:rPr>
+                                    <m:t>2</m:t>
+                                  </m:r>
+                                </m:den>
+                              </m:f>
+                            </m:e>
+                          </m:d>
+                        </m:e>
+                        <m:sup>
+                          <m:r>
+                            <a:rPr lang="en-US" sz="2400" b="0" i="1" smtClean="0">
+                              <a:latin typeface="Cambria Math" panose="02040503050406030204" pitchFamily="18" charset="0"/>
+                            </a:rPr>
+                            <m:t>2</m:t>
+                          </m:r>
+                        </m:sup>
+                      </m:sSup>
+                      <m:r>
+                        <a:rPr lang="en-US" sz="2400" b="0" i="1" smtClean="0">
+                          <a:latin typeface="Cambria Math" panose="02040503050406030204" pitchFamily="18" charset="0"/>
+                        </a:rPr>
+                        <m:t>≥</m:t>
+                      </m:r>
+                      <m:sSup>
+                        <m:sSupPr>
+                          <m:ctrlPr>
+                            <a:rPr lang="en-US" sz="2400" b="0" i="1" smtClean="0">
+                              <a:latin typeface="Cambria Math" panose="02040503050406030204" pitchFamily="18" charset="0"/>
+                            </a:rPr>
+                          </m:ctrlPr>
+                        </m:sSupPr>
+                        <m:e>
+                          <m:r>
+                            <a:rPr lang="en-US" sz="2400" b="0" i="1" smtClean="0">
+                              <a:latin typeface="Cambria Math" panose="02040503050406030204" pitchFamily="18" charset="0"/>
+                            </a:rPr>
+                            <m:t>𝑐</m:t>
+                          </m:r>
+                        </m:e>
+                        <m:sup>
+                          <m:r>
+                            <a:rPr lang="en-US" sz="2400" b="0" i="1" smtClean="0">
+                              <a:latin typeface="Cambria Math" panose="02040503050406030204" pitchFamily="18" charset="0"/>
+                            </a:rPr>
+                            <m:t>2</m:t>
+                          </m:r>
+                        </m:sup>
+                      </m:sSup>
+                      <m:r>
+                        <a:rPr lang="en-US" sz="2400" b="0" i="1" smtClean="0">
+                          <a:latin typeface="Cambria Math" panose="02040503050406030204" pitchFamily="18" charset="0"/>
+                        </a:rPr>
+                        <m:t>&gt;</m:t>
+                      </m:r>
+                      <m:r>
+                        <a:rPr lang="en-US" sz="2400" b="0" i="1" smtClean="0">
+                          <a:latin typeface="Cambria Math" panose="02040503050406030204" pitchFamily="18" charset="0"/>
+                        </a:rPr>
+                        <m:t>𝑎𝑏</m:t>
+                      </m:r>
+                    </m:oMath>
+                  </m:oMathPara>
+                </a14:m>
+                <a:endParaRPr lang="en-US" sz="2400" dirty="0"/>
+              </a:p>
+            </p:txBody>
+          </p:sp>
+        </mc:Choice>
+        <mc:Fallback>
+          <p:sp>
+            <p:nvSpPr>
+              <p:cNvPr id="18" name="TextBox 17">
+                <a:extLst>
+                  <a:ext uri="{FF2B5EF4-FFF2-40B4-BE49-F238E27FC236}">
+                    <a16:creationId xmlns:a16="http://schemas.microsoft.com/office/drawing/2014/main" id="{94D772C8-59F4-853D-AF2F-85FDBB3CE43F}"/>
+                  </a:ext>
+                </a:extLst>
+              </p:cNvPr>
+              <p:cNvSpPr txBox="1">
+                <a:spLocks noRot="1" noChangeAspect="1" noMove="1" noResize="1" noEditPoints="1" noAdjustHandles="1" noChangeArrowheads="1" noChangeShapeType="1" noTextEdit="1"/>
+              </p:cNvSpPr>
+              <p:nvPr/>
+            </p:nvSpPr>
+            <p:spPr>
+              <a:xfrm>
+                <a:off x="6561482" y="2295474"/>
+                <a:ext cx="2982583" cy="995144"/>
+              </a:xfrm>
+              <a:prstGeom prst="rect">
+                <a:avLst/>
+              </a:prstGeom>
+              <a:blipFill>
+                <a:blip r:embed="rId7"/>
+                <a:stretch>
+                  <a:fillRect/>
+                </a:stretch>
+              </a:blipFill>
+            </p:spPr>
+            <p:txBody>
+              <a:bodyPr/>
+              <a:lstStyle/>
+              <a:p>
+                <a:r>
+                  <a:rPr lang="en-US">
+                    <a:noFill/>
+                  </a:rPr>
+                  <a:t> </a:t>
+                </a:r>
+              </a:p>
+            </p:txBody>
+          </p:sp>
+        </mc:Fallback>
+      </mc:AlternateContent>
+      <mc:AlternateContent xmlns:mc="http://schemas.openxmlformats.org/markup-compatibility/2006">
+        <mc:Choice xmlns:a14="http://schemas.microsoft.com/office/drawing/2010/main" Requires="a14">
+          <p:sp>
+            <p:nvSpPr>
+              <p:cNvPr id="19" name="TextBox 18">
+                <a:extLst>
+                  <a:ext uri="{FF2B5EF4-FFF2-40B4-BE49-F238E27FC236}">
+                    <a16:creationId xmlns:a16="http://schemas.microsoft.com/office/drawing/2014/main" id="{97000843-DA01-6AF2-0567-252C7F208789}"/>
+                  </a:ext>
+                </a:extLst>
+              </p:cNvPr>
+              <p:cNvSpPr txBox="1"/>
+              <p:nvPr/>
+            </p:nvSpPr>
+            <p:spPr>
+              <a:xfrm>
+                <a:off x="4393131" y="2990840"/>
+                <a:ext cx="2203232" cy="1004570"/>
+              </a:xfrm>
+              <a:prstGeom prst="rect">
+                <a:avLst/>
+              </a:prstGeom>
+              <a:noFill/>
+            </p:spPr>
+            <p:txBody>
+              <a:bodyPr wrap="none" rtlCol="0">
+                <a:spAutoFit/>
+              </a:bodyPr>
+              <a:lstStyle/>
+              <a:p>
+                <a:pPr/>
+                <a14:m>
+                  <m:oMathPara xmlns:m="http://schemas.openxmlformats.org/officeDocument/2006/math">
+                    <m:oMathParaPr>
+                      <m:jc m:val="centerGroup"/>
+                    </m:oMathParaPr>
+                    <m:oMath xmlns:m="http://schemas.openxmlformats.org/officeDocument/2006/math">
+                      <m:sSup>
+                        <m:sSupPr>
+                          <m:ctrlPr>
+                            <a:rPr lang="en-US" sz="2400" b="1" i="1" smtClean="0">
+                              <a:latin typeface="Cambria Math" panose="02040503050406030204" pitchFamily="18" charset="0"/>
+                            </a:rPr>
+                          </m:ctrlPr>
+                        </m:sSupPr>
+                        <m:e>
+                          <m:d>
+                            <m:dPr>
+                              <m:ctrlPr>
+                                <a:rPr lang="en-US" sz="2400" b="1" i="1" smtClean="0">
+                                  <a:latin typeface="Cambria Math" panose="02040503050406030204" pitchFamily="18" charset="0"/>
+                                </a:rPr>
+                              </m:ctrlPr>
+                            </m:dPr>
+                            <m:e>
+                              <m:f>
+                                <m:fPr>
+                                  <m:ctrlPr>
+                                    <a:rPr lang="en-US" sz="2400" b="1" i="1" smtClean="0">
+                                      <a:latin typeface="Cambria Math" panose="02040503050406030204" pitchFamily="18" charset="0"/>
+                                    </a:rPr>
+                                  </m:ctrlPr>
+                                </m:fPr>
+                                <m:num>
+                                  <m:r>
+                                    <a:rPr lang="en-US" sz="2400" b="1" i="1" smtClean="0">
+                                      <a:latin typeface="Cambria Math" panose="02040503050406030204" pitchFamily="18" charset="0"/>
+                                    </a:rPr>
+                                    <m:t>𝒂</m:t>
+                                  </m:r>
+                                  <m:r>
+                                    <a:rPr lang="en-US" sz="2400" b="1" i="1" smtClean="0">
+                                      <a:latin typeface="Cambria Math" panose="02040503050406030204" pitchFamily="18" charset="0"/>
+                                    </a:rPr>
+                                    <m:t>+</m:t>
+                                  </m:r>
+                                  <m:r>
+                                    <a:rPr lang="en-US" sz="2400" b="1" i="1" smtClean="0">
+                                      <a:latin typeface="Cambria Math" panose="02040503050406030204" pitchFamily="18" charset="0"/>
+                                    </a:rPr>
+                                    <m:t>𝒃</m:t>
+                                  </m:r>
+                                </m:num>
+                                <m:den>
+                                  <m:r>
+                                    <a:rPr lang="en-US" sz="2400" b="1" i="1" smtClean="0">
+                                      <a:latin typeface="Cambria Math" panose="02040503050406030204" pitchFamily="18" charset="0"/>
+                                    </a:rPr>
+                                    <m:t>𝟐</m:t>
+                                  </m:r>
+                                </m:den>
+                              </m:f>
+                            </m:e>
+                          </m:d>
+                        </m:e>
+                        <m:sup>
+                          <m:r>
+                            <a:rPr lang="en-US" sz="2400" b="1" i="1" smtClean="0">
+                              <a:latin typeface="Cambria Math" panose="02040503050406030204" pitchFamily="18" charset="0"/>
+                            </a:rPr>
+                            <m:t>𝟐</m:t>
+                          </m:r>
+                        </m:sup>
+                      </m:sSup>
+                      <m:r>
+                        <a:rPr lang="en-US" sz="2400" b="1" i="1" smtClean="0">
+                          <a:latin typeface="Cambria Math" panose="02040503050406030204" pitchFamily="18" charset="0"/>
+                        </a:rPr>
+                        <m:t>≥</m:t>
+                      </m:r>
+                      <m:sSup>
+                        <m:sSupPr>
+                          <m:ctrlPr>
+                            <a:rPr lang="en-US" sz="2400" b="1" i="1" smtClean="0">
+                              <a:latin typeface="Cambria Math" panose="02040503050406030204" pitchFamily="18" charset="0"/>
+                            </a:rPr>
+                          </m:ctrlPr>
+                        </m:sSupPr>
+                        <m:e>
+                          <m:r>
+                            <a:rPr lang="en-US" sz="2400" b="1" i="1" smtClean="0">
+                              <a:latin typeface="Cambria Math" panose="02040503050406030204" pitchFamily="18" charset="0"/>
+                            </a:rPr>
+                            <m:t>𝒄</m:t>
+                          </m:r>
+                        </m:e>
+                        <m:sup>
+                          <m:r>
+                            <a:rPr lang="en-US" sz="2400" b="1" i="1" smtClean="0">
+                              <a:latin typeface="Cambria Math" panose="02040503050406030204" pitchFamily="18" charset="0"/>
+                            </a:rPr>
+                            <m:t>𝟐</m:t>
+                          </m:r>
+                        </m:sup>
+                      </m:sSup>
+                    </m:oMath>
+                  </m:oMathPara>
+                </a14:m>
+                <a:endParaRPr lang="en-US" sz="2400" b="1" dirty="0"/>
+              </a:p>
+            </p:txBody>
+          </p:sp>
+        </mc:Choice>
+        <mc:Fallback>
+          <p:sp>
+            <p:nvSpPr>
+              <p:cNvPr id="19" name="TextBox 18">
+                <a:extLst>
+                  <a:ext uri="{FF2B5EF4-FFF2-40B4-BE49-F238E27FC236}">
+                    <a16:creationId xmlns:a16="http://schemas.microsoft.com/office/drawing/2014/main" id="{97000843-DA01-6AF2-0567-252C7F208789}"/>
+                  </a:ext>
+                </a:extLst>
+              </p:cNvPr>
+              <p:cNvSpPr txBox="1">
+                <a:spLocks noRot="1" noChangeAspect="1" noMove="1" noResize="1" noEditPoints="1" noAdjustHandles="1" noChangeArrowheads="1" noChangeShapeType="1" noTextEdit="1"/>
+              </p:cNvSpPr>
+              <p:nvPr/>
+            </p:nvSpPr>
+            <p:spPr>
+              <a:xfrm>
+                <a:off x="4393131" y="2990840"/>
+                <a:ext cx="2203232" cy="1004570"/>
+              </a:xfrm>
+              <a:prstGeom prst="rect">
+                <a:avLst/>
+              </a:prstGeom>
+              <a:blipFill>
+                <a:blip r:embed="rId8"/>
+                <a:stretch>
+                  <a:fillRect/>
+                </a:stretch>
+              </a:blipFill>
+            </p:spPr>
+            <p:txBody>
+              <a:bodyPr/>
+              <a:lstStyle/>
+              <a:p>
+                <a:r>
+                  <a:rPr lang="en-US">
+                    <a:noFill/>
+                  </a:rPr>
+                  <a:t> </a:t>
+                </a:r>
+              </a:p>
+            </p:txBody>
+          </p:sp>
+        </mc:Fallback>
+      </mc:AlternateContent>
+      <mc:AlternateContent xmlns:mc="http://schemas.openxmlformats.org/markup-compatibility/2006">
+        <mc:Choice xmlns:a14="http://schemas.microsoft.com/office/drawing/2010/main" Requires="a14">
+          <p:sp>
+            <p:nvSpPr>
+              <p:cNvPr id="20" name="TextBox 19">
+                <a:extLst>
+                  <a:ext uri="{FF2B5EF4-FFF2-40B4-BE49-F238E27FC236}">
+                    <a16:creationId xmlns:a16="http://schemas.microsoft.com/office/drawing/2014/main" id="{4511B35A-B58E-3673-8E54-9A47353B34C6}"/>
+                  </a:ext>
+                </a:extLst>
+              </p:cNvPr>
+              <p:cNvSpPr txBox="1"/>
+              <p:nvPr/>
+            </p:nvSpPr>
+            <p:spPr>
+              <a:xfrm>
+                <a:off x="6213576" y="3163016"/>
+                <a:ext cx="2982583" cy="995144"/>
+              </a:xfrm>
+              <a:prstGeom prst="rect">
+                <a:avLst/>
+              </a:prstGeom>
+              <a:noFill/>
+            </p:spPr>
+            <p:txBody>
+              <a:bodyPr wrap="square">
+                <a:spAutoFit/>
+              </a:bodyPr>
+              <a:lstStyle/>
+              <a:p>
+                <a:pPr/>
+                <a14:m>
+                  <m:oMathPara xmlns:m="http://schemas.openxmlformats.org/officeDocument/2006/math">
+                    <m:oMathParaPr>
+                      <m:jc m:val="centerGroup"/>
+                    </m:oMathParaPr>
+                    <m:oMath xmlns:m="http://schemas.openxmlformats.org/officeDocument/2006/math">
+                      <m:sSup>
+                        <m:sSupPr>
+                          <m:ctrlPr>
+                            <a:rPr lang="en-US" sz="2400" b="0" i="1" smtClean="0">
+                              <a:latin typeface="Cambria Math" panose="02040503050406030204" pitchFamily="18" charset="0"/>
+                            </a:rPr>
+                          </m:ctrlPr>
+                        </m:sSupPr>
+                        <m:e>
+                          <m:d>
+                            <m:dPr>
+                              <m:ctrlPr>
+                                <a:rPr lang="en-US" sz="2400" b="0" i="1" smtClean="0">
+                                  <a:latin typeface="Cambria Math" panose="02040503050406030204" pitchFamily="18" charset="0"/>
+                                </a:rPr>
+                              </m:ctrlPr>
+                            </m:dPr>
+                            <m:e>
+                              <m:f>
+                                <m:fPr>
+                                  <m:ctrlPr>
+                                    <a:rPr lang="en-US" sz="2400" b="0" i="1" smtClean="0">
+                                      <a:latin typeface="Cambria Math" panose="02040503050406030204" pitchFamily="18" charset="0"/>
+                                    </a:rPr>
+                                  </m:ctrlPr>
+                                </m:fPr>
+                                <m:num>
+                                  <m:r>
+                                    <a:rPr lang="en-US" sz="2400" b="0" i="1" smtClean="0">
+                                      <a:latin typeface="Cambria Math" panose="02040503050406030204" pitchFamily="18" charset="0"/>
+                                    </a:rPr>
+                                    <m:t>𝑎</m:t>
+                                  </m:r>
+                                  <m:r>
+                                    <a:rPr lang="en-US" sz="2400" b="0" i="1" smtClean="0">
+                                      <a:latin typeface="Cambria Math" panose="02040503050406030204" pitchFamily="18" charset="0"/>
+                                    </a:rPr>
+                                    <m:t>+</m:t>
+                                  </m:r>
+                                  <m:r>
+                                    <a:rPr lang="en-US" sz="2400" b="0" i="1" smtClean="0">
+                                      <a:latin typeface="Cambria Math" panose="02040503050406030204" pitchFamily="18" charset="0"/>
+                                    </a:rPr>
+                                    <m:t>𝑏</m:t>
+                                  </m:r>
+                                </m:num>
+                                <m:den>
+                                  <m:r>
+                                    <a:rPr lang="en-US" sz="2400" b="0" i="1" smtClean="0">
+                                      <a:latin typeface="Cambria Math" panose="02040503050406030204" pitchFamily="18" charset="0"/>
+                                    </a:rPr>
+                                    <m:t>2</m:t>
+                                  </m:r>
+                                </m:den>
+                              </m:f>
+                            </m:e>
+                          </m:d>
+                        </m:e>
+                        <m:sup>
+                          <m:r>
+                            <a:rPr lang="en-US" sz="2400" b="0" i="1" smtClean="0">
+                              <a:latin typeface="Cambria Math" panose="02040503050406030204" pitchFamily="18" charset="0"/>
+                            </a:rPr>
+                            <m:t>2</m:t>
+                          </m:r>
+                        </m:sup>
+                      </m:sSup>
+                      <m:r>
+                        <a:rPr lang="en-US" sz="2400" b="0" i="1" smtClean="0">
+                          <a:latin typeface="Cambria Math" panose="02040503050406030204" pitchFamily="18" charset="0"/>
+                        </a:rPr>
+                        <m:t>&gt;</m:t>
+                      </m:r>
+                      <m:r>
+                        <a:rPr lang="en-US" sz="2400" b="0" i="1" smtClean="0">
+                          <a:latin typeface="Cambria Math" panose="02040503050406030204" pitchFamily="18" charset="0"/>
+                        </a:rPr>
+                        <m:t>𝑎𝑏</m:t>
+                      </m:r>
+                    </m:oMath>
+                  </m:oMathPara>
+                </a14:m>
+                <a:endParaRPr lang="en-US" sz="2400" dirty="0"/>
+              </a:p>
+            </p:txBody>
+          </p:sp>
+        </mc:Choice>
+        <mc:Fallback>
+          <p:sp>
+            <p:nvSpPr>
+              <p:cNvPr id="20" name="TextBox 19">
+                <a:extLst>
+                  <a:ext uri="{FF2B5EF4-FFF2-40B4-BE49-F238E27FC236}">
+                    <a16:creationId xmlns:a16="http://schemas.microsoft.com/office/drawing/2014/main" id="{4511B35A-B58E-3673-8E54-9A47353B34C6}"/>
+                  </a:ext>
+                </a:extLst>
+              </p:cNvPr>
+              <p:cNvSpPr txBox="1">
+                <a:spLocks noRot="1" noChangeAspect="1" noMove="1" noResize="1" noEditPoints="1" noAdjustHandles="1" noChangeArrowheads="1" noChangeShapeType="1" noTextEdit="1"/>
+              </p:cNvSpPr>
+              <p:nvPr/>
+            </p:nvSpPr>
+            <p:spPr>
+              <a:xfrm>
+                <a:off x="6213576" y="3163016"/>
+                <a:ext cx="2982583" cy="995144"/>
+              </a:xfrm>
+              <a:prstGeom prst="rect">
+                <a:avLst/>
+              </a:prstGeom>
+              <a:blipFill>
+                <a:blip r:embed="rId9"/>
+                <a:stretch>
+                  <a:fillRect/>
+                </a:stretch>
+              </a:blipFill>
+            </p:spPr>
+            <p:txBody>
+              <a:bodyPr/>
+              <a:lstStyle/>
+              <a:p>
+                <a:r>
+                  <a:rPr lang="en-US">
+                    <a:noFill/>
+                  </a:rPr>
+                  <a:t> </a:t>
+                </a:r>
+              </a:p>
+            </p:txBody>
+          </p:sp>
+        </mc:Fallback>
+      </mc:AlternateContent>
+    </p:spTree>
+    <p:extLst>
+      <p:ext uri="{BB962C8B-B14F-4D97-AF65-F5344CB8AC3E}">
+        <p14:creationId xmlns:p14="http://schemas.microsoft.com/office/powerpoint/2010/main" val="2771997167"/>
       </p:ext>
     </p:extLst>
   </p:cSld>
@@ -7115,6 +8456,15 @@
 </file>
 
 <file path=customXml/item1.xml><?xml version="1.0" encoding="utf-8"?>
+<?mso-contentType ?>
+<FormTemplates xmlns="http://schemas.microsoft.com/sharepoint/v3/contenttype/forms">
+  <Display>DocumentLibraryForm</Display>
+  <Edit>DocumentLibraryForm</Edit>
+  <New>DocumentLibraryForm</New>
+</FormTemplates>
+</file>
+
+<file path=customXml/item2.xml><?xml version="1.0" encoding="utf-8"?>
 <ct:contentTypeSchema xmlns:ct="http://schemas.microsoft.com/office/2006/metadata/contentType" xmlns:ma="http://schemas.microsoft.com/office/2006/metadata/properties/metaAttributes" ct:_="" ma:_="" ma:contentTypeName="Document" ma:contentTypeID="0x01010046D1E204285AF94CB6697BB3D122CA4F" ma:contentTypeVersion="11" ma:contentTypeDescription="Create a new document." ma:contentTypeScope="" ma:versionID="0da9709dceb975ceeceaf5935e1ac1ad">
   <xsd:schema xmlns:xsd="http://www.w3.org/2001/XMLSchema" xmlns:xs="http://www.w3.org/2001/XMLSchema" xmlns:p="http://schemas.microsoft.com/office/2006/metadata/properties" xmlns:ns3="28a15486-dae7-4535-b427-501fdc187937" xmlns:ns4="c27e06c0-a9f2-442f-a8fc-522e441ffda8" targetNamespace="http://schemas.microsoft.com/office/2006/metadata/properties" ma:root="true" ma:fieldsID="372433b83e78c8fe7792f47573ec6671" ns3:_="" ns4:_="">
     <xsd:import namespace="28a15486-dae7-4535-b427-501fdc187937"/>
@@ -7321,15 +8671,6 @@
 </ct:contentTypeSchema>
 </file>
 
-<file path=customXml/item2.xml><?xml version="1.0" encoding="utf-8"?>
-<?mso-contentType ?>
-<FormTemplates xmlns="http://schemas.microsoft.com/sharepoint/v3/contenttype/forms">
-  <Display>DocumentLibraryForm</Display>
-  <Edit>DocumentLibraryForm</Edit>
-  <New>DocumentLibraryForm</New>
-</FormTemplates>
-</file>
-
 <file path=customXml/item3.xml><?xml version="1.0" encoding="utf-8"?>
 <p:properties xmlns:p="http://schemas.microsoft.com/office/2006/metadata/properties" xmlns:xsi="http://www.w3.org/2001/XMLSchema-instance" xmlns:pc="http://schemas.microsoft.com/office/infopath/2007/PartnerControls">
   <documentManagement>
@@ -7339,6 +8680,14 @@
 </file>
 
 <file path=customXml/itemProps1.xml><?xml version="1.0" encoding="utf-8"?>
+<ds:datastoreItem xmlns:ds="http://schemas.openxmlformats.org/officeDocument/2006/customXml" ds:itemID="{4816C59C-2948-404F-9AF6-973E65CEC2EE}">
+  <ds:schemaRefs>
+    <ds:schemaRef ds:uri="http://schemas.microsoft.com/sharepoint/v3/contenttype/forms"/>
+  </ds:schemaRefs>
+</ds:datastoreItem>
+</file>
+
+<file path=customXml/itemProps2.xml><?xml version="1.0" encoding="utf-8"?>
 <ds:datastoreItem xmlns:ds="http://schemas.openxmlformats.org/officeDocument/2006/customXml" ds:itemID="{DCB7D50C-9C43-4BA2-9546-DA9FE1684090}">
   <ds:schemaRefs>
     <ds:schemaRef ds:uri="http://schemas.microsoft.com/office/2006/metadata/contentType"/>
@@ -7353,14 +8702,6 @@
     <ds:schemaRef ds:uri="http://purl.org/dc/elements/1.1/"/>
     <ds:schemaRef ds:uri="http://purl.org/dc/terms/"/>
     <ds:schemaRef ds:uri="http://schemas.microsoft.com/internal/obd"/>
-  </ds:schemaRefs>
-</ds:datastoreItem>
-</file>
-
-<file path=customXml/itemProps2.xml><?xml version="1.0" encoding="utf-8"?>
-<ds:datastoreItem xmlns:ds="http://schemas.openxmlformats.org/officeDocument/2006/customXml" ds:itemID="{4816C59C-2948-404F-9AF6-973E65CEC2EE}">
-  <ds:schemaRefs>
-    <ds:schemaRef ds:uri="http://schemas.microsoft.com/sharepoint/v3/contenttype/forms"/>
   </ds:schemaRefs>
 </ds:datastoreItem>
 </file>

</xml_diff>